<commit_message>
Modified devis in ppt
</commit_message>
<xml_diff>
--- a/Nesnoïd.pptx
+++ b/Nesnoïd.pptx
@@ -3004,7 +3004,7 @@
           <a:graphicData uri="http://schemas.openxmlformats.org/presentationml/2006/ole">
             <mc:AlternateContent xmlns:mc="http://schemas.openxmlformats.org/markup-compatibility/2006">
               <mc:Choice xmlns:v="urn:schemas-microsoft-com:vml" Requires="v">
-                <p:oleObj spid="_x0000_s2074" r:id="rId3" imgW="13002840" imgH="406080" progId="">
+                <p:oleObj spid="_x0000_s2078" r:id="rId3" imgW="13002840" imgH="406080" progId="">
                   <p:embed/>
                 </p:oleObj>
               </mc:Choice>
@@ -3061,7 +3061,7 @@
           <a:graphicData uri="http://schemas.openxmlformats.org/presentationml/2006/ole">
             <mc:AlternateContent xmlns:mc="http://schemas.openxmlformats.org/markup-compatibility/2006">
               <mc:Choice xmlns:v="urn:schemas-microsoft-com:vml" Requires="v">
-                <p:oleObj spid="_x0000_s2075" r:id="rId5" imgW="13002840" imgH="406080" progId="">
+                <p:oleObj spid="_x0000_s2079" r:id="rId5" imgW="13002840" imgH="406080" progId="">
                   <p:embed/>
                 </p:oleObj>
               </mc:Choice>
@@ -3118,7 +3118,7 @@
           <a:graphicData uri="http://schemas.openxmlformats.org/presentationml/2006/ole">
             <mc:AlternateContent xmlns:mc="http://schemas.openxmlformats.org/markup-compatibility/2006">
               <mc:Choice xmlns:v="urn:schemas-microsoft-com:vml" Requires="v">
-                <p:oleObj spid="_x0000_s2076" r:id="rId6" imgW="13002840" imgH="406080" progId="">
+                <p:oleObj spid="_x0000_s2080" r:id="rId6" imgW="13002840" imgH="406080" progId="">
                   <p:embed/>
                 </p:oleObj>
               </mc:Choice>
@@ -3175,7 +3175,7 @@
           <a:graphicData uri="http://schemas.openxmlformats.org/presentationml/2006/ole">
             <mc:AlternateContent xmlns:mc="http://schemas.openxmlformats.org/markup-compatibility/2006">
               <mc:Choice xmlns:v="urn:schemas-microsoft-com:vml" Requires="v">
-                <p:oleObj spid="_x0000_s2077" r:id="rId7" imgW="13002840" imgH="406080" progId="">
+                <p:oleObj spid="_x0000_s2081" r:id="rId7" imgW="13002840" imgH="406080" progId="">
                   <p:embed/>
                 </p:oleObj>
               </mc:Choice>
@@ -4091,7 +4091,7 @@
           <a:graphicData uri="http://schemas.openxmlformats.org/presentationml/2006/ole">
             <mc:AlternateContent xmlns:mc="http://schemas.openxmlformats.org/markup-compatibility/2006">
               <mc:Choice xmlns:v="urn:schemas-microsoft-com:vml" Requires="v">
-                <p:oleObj spid="_x0000_s1035" r:id="rId8" imgW="13002840" imgH="406080" progId="">
+                <p:oleObj spid="_x0000_s1037" r:id="rId8" imgW="13002840" imgH="406080" progId="">
                   <p:embed/>
                 </p:oleObj>
               </mc:Choice>
@@ -4148,7 +4148,7 @@
           <a:graphicData uri="http://schemas.openxmlformats.org/presentationml/2006/ole">
             <mc:AlternateContent xmlns:mc="http://schemas.openxmlformats.org/markup-compatibility/2006">
               <mc:Choice xmlns:v="urn:schemas-microsoft-com:vml" Requires="v">
-                <p:oleObj spid="_x0000_s1036" r:id="rId10" imgW="13002840" imgH="406080" progId="">
+                <p:oleObj spid="_x0000_s1038" r:id="rId10" imgW="13002840" imgH="406080" progId="">
                   <p:embed/>
                 </p:oleObj>
               </mc:Choice>
@@ -4320,7 +4320,7 @@
           <a:graphicData uri="http://schemas.openxmlformats.org/presentationml/2006/ole">
             <mc:AlternateContent xmlns:mc="http://schemas.openxmlformats.org/markup-compatibility/2006">
               <mc:Choice xmlns:v="urn:schemas-microsoft-com:vml" Requires="v">
-                <p:oleObj spid="_x0000_s3086" r:id="rId3" imgW="13002840" imgH="406080" progId="">
+                <p:oleObj spid="_x0000_s3088" r:id="rId3" imgW="13002840" imgH="406080" progId="">
                   <p:embed/>
                 </p:oleObj>
               </mc:Choice>
@@ -4377,7 +4377,7 @@
           <a:graphicData uri="http://schemas.openxmlformats.org/presentationml/2006/ole">
             <mc:AlternateContent xmlns:mc="http://schemas.openxmlformats.org/markup-compatibility/2006">
               <mc:Choice xmlns:v="urn:schemas-microsoft-com:vml" Requires="v">
-                <p:oleObj spid="_x0000_s3087" r:id="rId5" imgW="13002840" imgH="406080" progId="">
+                <p:oleObj spid="_x0000_s3089" r:id="rId5" imgW="13002840" imgH="406080" progId="">
                   <p:embed/>
                 </p:oleObj>
               </mc:Choice>
@@ -4737,7 +4737,7 @@
           <a:graphicData uri="http://schemas.openxmlformats.org/presentationml/2006/ole">
             <mc:AlternateContent xmlns:mc="http://schemas.openxmlformats.org/markup-compatibility/2006">
               <mc:Choice xmlns:v="urn:schemas-microsoft-com:vml" Requires="v">
-                <p:oleObj spid="_x0000_s8204" r:id="rId3" imgW="13002840" imgH="406080" progId="">
+                <p:oleObj spid="_x0000_s8206" r:id="rId3" imgW="13002840" imgH="406080" progId="">
                   <p:embed/>
                 </p:oleObj>
               </mc:Choice>
@@ -4794,7 +4794,7 @@
           <a:graphicData uri="http://schemas.openxmlformats.org/presentationml/2006/ole">
             <mc:AlternateContent xmlns:mc="http://schemas.openxmlformats.org/markup-compatibility/2006">
               <mc:Choice xmlns:v="urn:schemas-microsoft-com:vml" Requires="v">
-                <p:oleObj spid="_x0000_s8205" r:id="rId5" imgW="13002840" imgH="406080" progId="">
+                <p:oleObj spid="_x0000_s8207" r:id="rId5" imgW="13002840" imgH="406080" progId="">
                   <p:embed/>
                 </p:oleObj>
               </mc:Choice>
@@ -4919,7 +4919,7 @@
           <p:cNvPr id="6" name="ZoneTexte 5">
             <a:extLst>
               <a:ext uri="{FF2B5EF4-FFF2-40B4-BE49-F238E27FC236}">
-                <a16:creationId xmlns:a16="http://schemas.microsoft.com/office/drawing/2014/main" id="{F16D0DD9-74DB-48D6-AE74-A0D7219E3172}"/>
+                <a16:creationId xmlns:a16="http://schemas.microsoft.com/office/drawing/2014/main" xmlns="" id="{F16D0DD9-74DB-48D6-AE74-A0D7219E3172}"/>
               </a:ext>
             </a:extLst>
           </p:cNvPr>
@@ -4996,7 +4996,7 @@
           <p:cNvPr id="3" name="Image 2">
             <a:extLst>
               <a:ext uri="{FF2B5EF4-FFF2-40B4-BE49-F238E27FC236}">
-                <a16:creationId xmlns:a16="http://schemas.microsoft.com/office/drawing/2014/main" id="{CFEA1E9E-8DF5-40F1-9EFC-3BA7778F6C01}"/>
+                <a16:creationId xmlns:a16="http://schemas.microsoft.com/office/drawing/2014/main" xmlns="" id="{CFEA1E9E-8DF5-40F1-9EFC-3BA7778F6C01}"/>
               </a:ext>
             </a:extLst>
           </p:cNvPr>
@@ -5079,7 +5079,7 @@
           <a:graphicData uri="http://schemas.openxmlformats.org/presentationml/2006/ole">
             <mc:AlternateContent xmlns:mc="http://schemas.openxmlformats.org/markup-compatibility/2006">
               <mc:Choice xmlns:v="urn:schemas-microsoft-com:vml" Requires="v">
-                <p:oleObj spid="_x0000_s4127" r:id="rId3" imgW="13002840" imgH="406080" progId="">
+                <p:oleObj spid="_x0000_s4132" r:id="rId3" imgW="13002840" imgH="406080" progId="">
                   <p:embed/>
                 </p:oleObj>
               </mc:Choice>
@@ -5136,7 +5136,7 @@
           <a:graphicData uri="http://schemas.openxmlformats.org/presentationml/2006/ole">
             <mc:AlternateContent xmlns:mc="http://schemas.openxmlformats.org/markup-compatibility/2006">
               <mc:Choice xmlns:v="urn:schemas-microsoft-com:vml" Requires="v">
-                <p:oleObj spid="_x0000_s4128" r:id="rId5" imgW="13002840" imgH="406080" progId="">
+                <p:oleObj spid="_x0000_s4133" r:id="rId5" imgW="13002840" imgH="406080" progId="">
                   <p:embed/>
                 </p:oleObj>
               </mc:Choice>
@@ -5278,7 +5278,7 @@
           <a:graphicData uri="http://schemas.openxmlformats.org/presentationml/2006/ole">
             <mc:AlternateContent xmlns:mc="http://schemas.openxmlformats.org/markup-compatibility/2006">
               <mc:Choice xmlns:v="urn:schemas-microsoft-com:vml" Requires="v">
-                <p:oleObj spid="_x0000_s4129" r:id="rId6" imgW="17739360" imgH="8025120" progId="">
+                <p:oleObj spid="_x0000_s4134" r:id="rId6" imgW="17739360" imgH="8025120" progId="">
                   <p:embed/>
                 </p:oleObj>
               </mc:Choice>
@@ -5335,7 +5335,7 @@
           <a:graphicData uri="http://schemas.openxmlformats.org/presentationml/2006/ole">
             <mc:AlternateContent xmlns:mc="http://schemas.openxmlformats.org/markup-compatibility/2006">
               <mc:Choice xmlns:v="urn:schemas-microsoft-com:vml" Requires="v">
-                <p:oleObj spid="_x0000_s4130" r:id="rId8" imgW="1472760" imgH="1485360" progId="">
+                <p:oleObj spid="_x0000_s4135" r:id="rId8" imgW="1472760" imgH="1485360" progId="">
                   <p:embed/>
                 </p:oleObj>
               </mc:Choice>
@@ -5392,7 +5392,7 @@
           <a:graphicData uri="http://schemas.openxmlformats.org/presentationml/2006/ole">
             <mc:AlternateContent xmlns:mc="http://schemas.openxmlformats.org/markup-compatibility/2006">
               <mc:Choice xmlns:v="urn:schemas-microsoft-com:vml" Requires="v">
-                <p:oleObj spid="_x0000_s4131" r:id="rId10" imgW="2691720" imgH="749160" progId="">
+                <p:oleObj spid="_x0000_s4136" r:id="rId10" imgW="2691720" imgH="749160" progId="">
                   <p:embed/>
                 </p:oleObj>
               </mc:Choice>
@@ -5537,7 +5537,7 @@
           <a:graphicData uri="http://schemas.openxmlformats.org/presentationml/2006/ole">
             <mc:AlternateContent xmlns:mc="http://schemas.openxmlformats.org/markup-compatibility/2006">
               <mc:Choice xmlns:v="urn:schemas-microsoft-com:vml" Requires="v">
-                <p:oleObj spid="_x0000_s7178" r:id="rId3" imgW="13002840" imgH="406080" progId="">
+                <p:oleObj spid="_x0000_s7180" r:id="rId3" imgW="13002840" imgH="406080" progId="">
                   <p:embed/>
                 </p:oleObj>
               </mc:Choice>
@@ -5594,7 +5594,7 @@
           <a:graphicData uri="http://schemas.openxmlformats.org/presentationml/2006/ole">
             <mc:AlternateContent xmlns:mc="http://schemas.openxmlformats.org/markup-compatibility/2006">
               <mc:Choice xmlns:v="urn:schemas-microsoft-com:vml" Requires="v">
-                <p:oleObj spid="_x0000_s7179" r:id="rId5" imgW="13002840" imgH="406080" progId="">
+                <p:oleObj spid="_x0000_s7181" r:id="rId5" imgW="13002840" imgH="406080" progId="">
                   <p:embed/>
                 </p:oleObj>
               </mc:Choice>
@@ -5719,7 +5719,7 @@
           <p:cNvPr id="7" name="ZoneTexte 6">
             <a:extLst>
               <a:ext uri="{FF2B5EF4-FFF2-40B4-BE49-F238E27FC236}">
-                <a16:creationId xmlns:a16="http://schemas.microsoft.com/office/drawing/2014/main" id="{E22C0459-609A-4135-A270-B2B3A354C999}"/>
+                <a16:creationId xmlns:a16="http://schemas.microsoft.com/office/drawing/2014/main" xmlns="" id="{E22C0459-609A-4135-A270-B2B3A354C999}"/>
               </a:ext>
             </a:extLst>
           </p:cNvPr>
@@ -5885,7 +5885,7 @@
           <a:graphicData uri="http://schemas.openxmlformats.org/presentationml/2006/ole">
             <mc:AlternateContent xmlns:mc="http://schemas.openxmlformats.org/markup-compatibility/2006">
               <mc:Choice xmlns:v="urn:schemas-microsoft-com:vml" Requires="v">
-                <p:oleObj spid="_x0000_s6156" r:id="rId3" imgW="13002840" imgH="406080" progId="">
+                <p:oleObj spid="_x0000_s6158" r:id="rId3" imgW="13002840" imgH="406080" progId="">
                   <p:embed/>
                 </p:oleObj>
               </mc:Choice>
@@ -5942,7 +5942,7 @@
           <a:graphicData uri="http://schemas.openxmlformats.org/presentationml/2006/ole">
             <mc:AlternateContent xmlns:mc="http://schemas.openxmlformats.org/markup-compatibility/2006">
               <mc:Choice xmlns:v="urn:schemas-microsoft-com:vml" Requires="v">
-                <p:oleObj spid="_x0000_s6157" r:id="rId5" imgW="13002840" imgH="406080" progId="">
+                <p:oleObj spid="_x0000_s6159" r:id="rId5" imgW="13002840" imgH="406080" progId="">
                   <p:embed/>
                 </p:oleObj>
               </mc:Choice>
@@ -6320,7 +6320,7 @@
           <a:graphicData uri="http://schemas.openxmlformats.org/presentationml/2006/ole">
             <mc:AlternateContent xmlns:mc="http://schemas.openxmlformats.org/markup-compatibility/2006">
               <mc:Choice xmlns:v="urn:schemas-microsoft-com:vml" Requires="v">
-                <p:oleObj spid="_x0000_s5130" r:id="rId3" imgW="13002840" imgH="406080" progId="">
+                <p:oleObj spid="_x0000_s5132" r:id="rId3" imgW="13002840" imgH="406080" progId="">
                   <p:embed/>
                 </p:oleObj>
               </mc:Choice>
@@ -6377,7 +6377,7 @@
           <a:graphicData uri="http://schemas.openxmlformats.org/presentationml/2006/ole">
             <mc:AlternateContent xmlns:mc="http://schemas.openxmlformats.org/markup-compatibility/2006">
               <mc:Choice xmlns:v="urn:schemas-microsoft-com:vml" Requires="v">
-                <p:oleObj spid="_x0000_s5131" r:id="rId5" imgW="13002840" imgH="406080" progId="">
+                <p:oleObj spid="_x0000_s5133" r:id="rId5" imgW="13002840" imgH="406080" progId="">
                   <p:embed/>
                 </p:oleObj>
               </mc:Choice>
@@ -6506,14 +6506,14 @@
           <p:nvPr>
             <p:extLst>
               <p:ext uri="{D42A27DB-BD31-4B8C-83A1-F6EECF244321}">
-                <p14:modId xmlns:p14="http://schemas.microsoft.com/office/powerpoint/2010/main" val="410726612"/>
+                <p14:modId xmlns:p14="http://schemas.microsoft.com/office/powerpoint/2010/main" val="2614414227"/>
               </p:ext>
             </p:extLst>
           </p:nvPr>
         </p:nvGraphicFramePr>
         <p:xfrm>
           <a:off x="2044914" y="1458655"/>
-          <a:ext cx="8128000" cy="4439920"/>
+          <a:ext cx="8128000" cy="3698240"/>
         </p:xfrm>
         <a:graphic>
           <a:graphicData uri="http://schemas.openxmlformats.org/drawingml/2006/table">
@@ -6532,21 +6532,21 @@
                 <a:gridCol w="369328">
                   <a:extLst>
                     <a:ext uri="{9D8B030D-6E8A-4147-A177-3AD203B41FA5}">
-                      <a16:colId xmlns:a16="http://schemas.microsoft.com/office/drawing/2014/main" val="1734895218"/>
+                      <a16:colId xmlns:a16="http://schemas.microsoft.com/office/drawing/2014/main" xmlns="" val="1734895218"/>
                     </a:ext>
                   </a:extLst>
                 </a:gridCol>
                 <a:gridCol w="5835236">
                   <a:extLst>
                     <a:ext uri="{9D8B030D-6E8A-4147-A177-3AD203B41FA5}">
-                      <a16:colId xmlns:a16="http://schemas.microsoft.com/office/drawing/2014/main" val="908248774"/>
+                      <a16:colId xmlns:a16="http://schemas.microsoft.com/office/drawing/2014/main" xmlns="" val="908248774"/>
                     </a:ext>
                   </a:extLst>
                 </a:gridCol>
                 <a:gridCol w="1923436">
                   <a:extLst>
                     <a:ext uri="{9D8B030D-6E8A-4147-A177-3AD203B41FA5}">
-                      <a16:colId xmlns:a16="http://schemas.microsoft.com/office/drawing/2014/main" val="2529677039"/>
+                      <a16:colId xmlns:a16="http://schemas.microsoft.com/office/drawing/2014/main" xmlns="" val="2529677039"/>
                     </a:ext>
                   </a:extLst>
                 </a:gridCol>
@@ -6637,7 +6637,7 @@
                 </a:tc>
                 <a:extLst>
                   <a:ext uri="{0D108BD9-81ED-4DB2-BD59-A6C34878D82A}">
-                    <a16:rowId xmlns:a16="http://schemas.microsoft.com/office/drawing/2014/main" val="744536208"/>
+                    <a16:rowId xmlns:a16="http://schemas.microsoft.com/office/drawing/2014/main" xmlns="" val="744536208"/>
                   </a:ext>
                 </a:extLst>
               </a:tr>
@@ -6691,7 +6691,7 @@
                     <a:p>
                       <a:pPr algn="r"/>
                       <a:r>
-                        <a:rPr lang="fr-FR" b="0" dirty="0">
+                        <a:rPr lang="fr-FR" b="0" dirty="0" smtClean="0">
                           <a:solidFill>
                             <a:schemeClr val="tx1">
                               <a:lumMod val="65000"/>
@@ -6700,8 +6700,17 @@
                           </a:solidFill>
                           <a:latin typeface="+mn-lt"/>
                         </a:rPr>
-                        <a:t>4000€</a:t>
+                        <a:t>6250€</a:t>
                       </a:r>
+                      <a:endParaRPr lang="fr-FR" b="0" dirty="0">
+                        <a:solidFill>
+                          <a:schemeClr val="tx1">
+                            <a:lumMod val="65000"/>
+                            <a:lumOff val="35000"/>
+                          </a:schemeClr>
+                        </a:solidFill>
+                        <a:latin typeface="+mn-lt"/>
+                      </a:endParaRPr>
                     </a:p>
                   </a:txBody>
                   <a:tcPr>
@@ -6721,7 +6730,7 @@
                 </a:tc>
                 <a:extLst>
                   <a:ext uri="{0D108BD9-81ED-4DB2-BD59-A6C34878D82A}">
-                    <a16:rowId xmlns:a16="http://schemas.microsoft.com/office/drawing/2014/main" val="2523755799"/>
+                    <a16:rowId xmlns:a16="http://schemas.microsoft.com/office/drawing/2014/main" xmlns="" val="2523755799"/>
                   </a:ext>
                 </a:extLst>
               </a:tr>
@@ -6824,7 +6833,7 @@
                 </a:tc>
                 <a:extLst>
                   <a:ext uri="{0D108BD9-81ED-4DB2-BD59-A6C34878D82A}">
-                    <a16:rowId xmlns:a16="http://schemas.microsoft.com/office/drawing/2014/main" val="1214565585"/>
+                    <a16:rowId xmlns:a16="http://schemas.microsoft.com/office/drawing/2014/main" xmlns="" val="1214565585"/>
                   </a:ext>
                 </a:extLst>
               </a:tr>
@@ -6898,7 +6907,7 @@
                         <a:defRPr/>
                       </a:pPr>
                       <a:r>
-                        <a:rPr lang="fr-FR" sz="1600" b="0" dirty="0">
+                        <a:rPr lang="fr-FR" sz="1600" b="0" dirty="0" smtClean="0">
                           <a:solidFill>
                             <a:schemeClr val="tx1">
                               <a:lumMod val="65000"/>
@@ -6907,8 +6916,17 @@
                           </a:solidFill>
                           <a:latin typeface="+mn-lt"/>
                         </a:rPr>
-                        <a:t>Multijoueur</a:t>
+                        <a:t>Menu</a:t>
                       </a:r>
+                      <a:endParaRPr lang="fr-FR" sz="1600" b="0" dirty="0">
+                        <a:solidFill>
+                          <a:schemeClr val="tx1">
+                            <a:lumMod val="65000"/>
+                            <a:lumOff val="35000"/>
+                          </a:schemeClr>
+                        </a:solidFill>
+                        <a:latin typeface="+mn-lt"/>
+                      </a:endParaRPr>
                     </a:p>
                   </a:txBody>
                   <a:tcPr>
@@ -6924,7 +6942,7 @@
                     <a:p>
                       <a:pPr algn="r"/>
                       <a:r>
-                        <a:rPr lang="fr-FR" b="0" dirty="0">
+                        <a:rPr lang="fr-FR" b="0" dirty="0" smtClean="0">
                           <a:solidFill>
                             <a:schemeClr val="tx1">
                               <a:lumMod val="65000"/>
@@ -6933,8 +6951,17 @@
                           </a:solidFill>
                           <a:latin typeface="+mn-lt"/>
                         </a:rPr>
-                        <a:t>1200€</a:t>
+                        <a:t>1000€</a:t>
                       </a:r>
+                      <a:endParaRPr lang="fr-FR" b="0" dirty="0">
+                        <a:solidFill>
+                          <a:schemeClr val="tx1">
+                            <a:lumMod val="65000"/>
+                            <a:lumOff val="35000"/>
+                          </a:schemeClr>
+                        </a:solidFill>
+                        <a:latin typeface="+mn-lt"/>
+                      </a:endParaRPr>
                     </a:p>
                   </a:txBody>
                   <a:tcPr>
@@ -6954,7 +6981,7 @@
                 </a:tc>
                 <a:extLst>
                   <a:ext uri="{0D108BD9-81ED-4DB2-BD59-A6C34878D82A}">
-                    <a16:rowId xmlns:a16="http://schemas.microsoft.com/office/drawing/2014/main" val="1826921360"/>
+                    <a16:rowId xmlns:a16="http://schemas.microsoft.com/office/drawing/2014/main" xmlns="" val="1826921360"/>
                   </a:ext>
                 </a:extLst>
               </a:tr>
@@ -7028,7 +7055,7 @@
                         <a:defRPr/>
                       </a:pPr>
                       <a:r>
-                        <a:rPr lang="fr-FR" sz="1600" b="0" dirty="0" err="1">
+                        <a:rPr lang="fr-FR" sz="1600" b="0" dirty="0" smtClean="0">
                           <a:solidFill>
                             <a:schemeClr val="tx1">
                               <a:lumMod val="65000"/>
@@ -7037,20 +7064,17 @@
                           </a:solidFill>
                           <a:latin typeface="+mn-lt"/>
                         </a:rPr>
-                        <a:t>Mods</a:t>
+                        <a:t>Musique / Bruitages</a:t>
                       </a:r>
-                      <a:r>
-                        <a:rPr lang="fr-FR" sz="1600" b="0" dirty="0">
-                          <a:solidFill>
-                            <a:schemeClr val="tx1">
-                              <a:lumMod val="65000"/>
-                              <a:lumOff val="35000"/>
-                            </a:schemeClr>
-                          </a:solidFill>
-                          <a:latin typeface="+mn-lt"/>
-                        </a:rPr>
-                        <a:t>/Cartes</a:t>
-                      </a:r>
+                      <a:endParaRPr lang="fr-FR" sz="1600" b="0" dirty="0">
+                        <a:solidFill>
+                          <a:schemeClr val="tx1">
+                            <a:lumMod val="65000"/>
+                            <a:lumOff val="35000"/>
+                          </a:schemeClr>
+                        </a:solidFill>
+                        <a:latin typeface="+mn-lt"/>
+                      </a:endParaRPr>
                     </a:p>
                   </a:txBody>
                   <a:tcPr>
@@ -7068,7 +7092,7 @@
                     <a:p>
                       <a:pPr algn="r"/>
                       <a:r>
-                        <a:rPr lang="fr-FR" b="0" dirty="0">
+                        <a:rPr lang="fr-FR" b="0" dirty="0" smtClean="0">
                           <a:solidFill>
                             <a:schemeClr val="tx1">
                               <a:lumMod val="65000"/>
@@ -7077,8 +7101,17 @@
                           </a:solidFill>
                           <a:latin typeface="+mn-lt"/>
                         </a:rPr>
-                        <a:t>700€</a:t>
+                        <a:t>1500€</a:t>
                       </a:r>
+                      <a:endParaRPr lang="fr-FR" b="0" dirty="0">
+                        <a:solidFill>
+                          <a:schemeClr val="tx1">
+                            <a:lumMod val="65000"/>
+                            <a:lumOff val="35000"/>
+                          </a:schemeClr>
+                        </a:solidFill>
+                        <a:latin typeface="+mn-lt"/>
+                      </a:endParaRPr>
                     </a:p>
                   </a:txBody>
                   <a:tcPr>
@@ -7098,7 +7131,7 @@
                 </a:tc>
                 <a:extLst>
                   <a:ext uri="{0D108BD9-81ED-4DB2-BD59-A6C34878D82A}">
-                    <a16:rowId xmlns:a16="http://schemas.microsoft.com/office/drawing/2014/main" val="2932840409"/>
+                    <a16:rowId xmlns:a16="http://schemas.microsoft.com/office/drawing/2014/main" xmlns="" val="2932840409"/>
                   </a:ext>
                 </a:extLst>
               </a:tr>
@@ -7193,7 +7226,19 @@
                           </a:solidFill>
                           <a:latin typeface="+mn-lt"/>
                         </a:rPr>
-                        <a:t> de missions de différents types</a:t>
+                        <a:t> </a:t>
+                      </a:r>
+                      <a:r>
+                        <a:rPr lang="fr-FR" sz="1600" b="0" baseline="0" dirty="0" smtClean="0">
+                          <a:solidFill>
+                            <a:schemeClr val="tx1">
+                              <a:lumMod val="65000"/>
+                              <a:lumOff val="35000"/>
+                            </a:schemeClr>
+                          </a:solidFill>
+                          <a:latin typeface="+mn-lt"/>
+                        </a:rPr>
+                        <a:t>de niveau</a:t>
                       </a:r>
                       <a:endParaRPr lang="fr-FR" sz="1600" b="0" dirty="0">
                         <a:solidFill>
@@ -7219,7 +7264,7 @@
                     <a:p>
                       <a:pPr algn="r"/>
                       <a:r>
-                        <a:rPr lang="fr-FR" b="0" dirty="0">
+                        <a:rPr lang="fr-FR" b="0" dirty="0" smtClean="0">
                           <a:solidFill>
                             <a:schemeClr val="tx1">
                               <a:lumMod val="65000"/>
@@ -7228,8 +7273,17 @@
                           </a:solidFill>
                           <a:latin typeface="+mn-lt"/>
                         </a:rPr>
-                        <a:t>240€/types</a:t>
+                        <a:t>100€/niveau</a:t>
                       </a:r>
+                      <a:endParaRPr lang="fr-FR" b="0" dirty="0">
+                        <a:solidFill>
+                          <a:schemeClr val="tx1">
+                            <a:lumMod val="65000"/>
+                            <a:lumOff val="35000"/>
+                          </a:schemeClr>
+                        </a:solidFill>
+                        <a:latin typeface="+mn-lt"/>
+                      </a:endParaRPr>
                     </a:p>
                   </a:txBody>
                   <a:tcPr>
@@ -7249,7 +7303,205 @@
                 </a:tc>
                 <a:extLst>
                   <a:ext uri="{0D108BD9-81ED-4DB2-BD59-A6C34878D82A}">
-                    <a16:rowId xmlns:a16="http://schemas.microsoft.com/office/drawing/2014/main" val="3736278046"/>
+                    <a16:rowId xmlns:a16="http://schemas.microsoft.com/office/drawing/2014/main" xmlns="" val="3736278046"/>
+                  </a:ext>
+                </a:extLst>
+              </a:tr>
+              <a:tr h="347953">
+                <a:tc>
+                  <a:txBody>
+                    <a:bodyPr/>
+                    <a:lstStyle/>
+                    <a:p>
+                      <a:pPr marL="0" marR="0" lvl="0" indent="0" algn="l" defTabSz="914400" rtl="0" eaLnBrk="1" fontAlgn="auto" latinLnBrk="0" hangingPunct="1">
+                        <a:lnSpc>
+                          <a:spcPct val="100000"/>
+                        </a:lnSpc>
+                        <a:spcBef>
+                          <a:spcPts val="0"/>
+                        </a:spcBef>
+                        <a:spcAft>
+                          <a:spcPts val="0"/>
+                        </a:spcAft>
+                        <a:buClrTx/>
+                        <a:buSzTx/>
+                        <a:buFontTx/>
+                        <a:buNone/>
+                        <a:tabLst/>
+                        <a:defRPr/>
+                      </a:pPr>
+                      <a:endParaRPr lang="fr-FR" b="0" dirty="0">
+                        <a:solidFill>
+                          <a:schemeClr val="tx1">
+                            <a:lumMod val="65000"/>
+                            <a:lumOff val="35000"/>
+                          </a:schemeClr>
+                        </a:solidFill>
+                        <a:latin typeface="+mn-lt"/>
+                      </a:endParaRPr>
+                    </a:p>
+                  </a:txBody>
+                  <a:tcPr>
+                    <a:lnL w="12700" cap="flat" cmpd="sng" algn="ctr">
+                      <a:noFill/>
+                      <a:prstDash val="solid"/>
+                      <a:round/>
+                      <a:headEnd type="none" w="med" len="med"/>
+                      <a:tailEnd type="none" w="med" len="med"/>
+                    </a:lnL>
+                    <a:solidFill>
+                      <a:schemeClr val="bg1"/>
+                    </a:solidFill>
+                  </a:tcPr>
+                </a:tc>
+                <a:tc>
+                  <a:txBody>
+                    <a:bodyPr/>
+                    <a:lstStyle/>
+                    <a:p>
+                      <a:pPr marL="0" marR="0" lvl="0" indent="0" algn="l" defTabSz="914400" rtl="0" eaLnBrk="1" fontAlgn="auto" latinLnBrk="0" hangingPunct="1">
+                        <a:lnSpc>
+                          <a:spcPct val="100000"/>
+                        </a:lnSpc>
+                        <a:spcBef>
+                          <a:spcPts val="0"/>
+                        </a:spcBef>
+                        <a:spcAft>
+                          <a:spcPts val="0"/>
+                        </a:spcAft>
+                        <a:buClrTx/>
+                        <a:buSzTx/>
+                        <a:buFontTx/>
+                        <a:buNone/>
+                        <a:tabLst/>
+                        <a:defRPr/>
+                      </a:pPr>
+                      <a:r>
+                        <a:rPr lang="fr-FR" sz="1600" b="0" dirty="0" smtClean="0">
+                          <a:solidFill>
+                            <a:schemeClr val="tx1">
+                              <a:lumMod val="65000"/>
+                              <a:lumOff val="35000"/>
+                            </a:schemeClr>
+                          </a:solidFill>
+                          <a:latin typeface="+mn-lt"/>
+                        </a:rPr>
+                        <a:t>Bonus</a:t>
+                      </a:r>
+                      <a:r>
+                        <a:rPr lang="fr-FR" sz="1600" b="0" baseline="0" dirty="0" smtClean="0">
+                          <a:solidFill>
+                            <a:schemeClr val="tx1">
+                              <a:lumMod val="65000"/>
+                              <a:lumOff val="35000"/>
+                            </a:schemeClr>
+                          </a:solidFill>
+                          <a:latin typeface="+mn-lt"/>
+                        </a:rPr>
+                        <a:t> pour la balle</a:t>
+                      </a:r>
+                      <a:endParaRPr lang="fr-FR" sz="1600" b="0" dirty="0">
+                        <a:solidFill>
+                          <a:schemeClr val="tx1">
+                            <a:lumMod val="65000"/>
+                            <a:lumOff val="35000"/>
+                          </a:schemeClr>
+                        </a:solidFill>
+                        <a:latin typeface="+mn-lt"/>
+                      </a:endParaRPr>
+                    </a:p>
+                  </a:txBody>
+                  <a:tcPr>
+                    <a:solidFill>
+                      <a:schemeClr val="bg1">
+                        <a:lumMod val="95000"/>
+                      </a:schemeClr>
+                    </a:solidFill>
+                  </a:tcPr>
+                </a:tc>
+                <a:tc>
+                  <a:txBody>
+                    <a:bodyPr/>
+                    <a:lstStyle/>
+                    <a:p>
+                      <a:pPr algn="r"/>
+                      <a:r>
+                        <a:rPr lang="fr-FR" b="0" dirty="0">
+                          <a:solidFill>
+                            <a:schemeClr val="tx1">
+                              <a:lumMod val="65000"/>
+                              <a:lumOff val="35000"/>
+                            </a:schemeClr>
+                          </a:solidFill>
+                          <a:latin typeface="+mn-lt"/>
+                        </a:rPr>
+                        <a:t>2</a:t>
+                      </a:r>
+                      <a:r>
+                        <a:rPr lang="fr-FR" b="0" dirty="0" smtClean="0">
+                          <a:solidFill>
+                            <a:schemeClr val="tx1">
+                              <a:lumMod val="65000"/>
+                              <a:lumOff val="35000"/>
+                            </a:schemeClr>
+                          </a:solidFill>
+                          <a:latin typeface="+mn-lt"/>
+                        </a:rPr>
+                        <a:t>00</a:t>
+                      </a:r>
+                      <a:r>
+                        <a:rPr lang="fr-FR" b="0" dirty="0">
+                          <a:solidFill>
+                            <a:schemeClr val="tx1">
+                              <a:lumMod val="65000"/>
+                              <a:lumOff val="35000"/>
+                            </a:schemeClr>
+                          </a:solidFill>
+                          <a:latin typeface="+mn-lt"/>
+                        </a:rPr>
+                        <a:t>€</a:t>
+                      </a:r>
+                      <a:r>
+                        <a:rPr lang="fr-FR" b="0" dirty="0" smtClean="0">
+                          <a:solidFill>
+                            <a:schemeClr val="tx1">
+                              <a:lumMod val="65000"/>
+                              <a:lumOff val="35000"/>
+                            </a:schemeClr>
+                          </a:solidFill>
+                          <a:latin typeface="+mn-lt"/>
+                        </a:rPr>
+                        <a:t>/bonus</a:t>
+                      </a:r>
+                      <a:endParaRPr lang="fr-FR" b="0" dirty="0">
+                        <a:solidFill>
+                          <a:schemeClr val="tx1">
+                            <a:lumMod val="65000"/>
+                            <a:lumOff val="35000"/>
+                          </a:schemeClr>
+                        </a:solidFill>
+                        <a:latin typeface="+mn-lt"/>
+                      </a:endParaRPr>
+                    </a:p>
+                  </a:txBody>
+                  <a:tcPr>
+                    <a:lnR w="12700" cap="flat" cmpd="sng" algn="ctr">
+                      <a:noFill/>
+                      <a:prstDash val="solid"/>
+                      <a:round/>
+                      <a:headEnd type="none" w="med" len="med"/>
+                      <a:tailEnd type="none" w="med" len="med"/>
+                    </a:lnR>
+                    <a:solidFill>
+                      <a:schemeClr val="bg1">
+                        <a:lumMod val="95000"/>
+                      </a:schemeClr>
+                    </a:solidFill>
+                  </a:tcPr>
+                </a:tc>
+                <a:extLst>
+                  <a:ext uri="{0D108BD9-81ED-4DB2-BD59-A6C34878D82A}">
+                    <a16:rowId xmlns:a16="http://schemas.microsoft.com/office/drawing/2014/main" xmlns="" val="2493942223"/>
                   </a:ext>
                 </a:extLst>
               </a:tr>
@@ -7323,7 +7575,7 @@
                         <a:defRPr/>
                       </a:pPr>
                       <a:r>
-                        <a:rPr lang="fr-FR" sz="1600" b="0" dirty="0">
+                        <a:rPr lang="fr-FR" sz="1600" b="0" baseline="0" dirty="0" smtClean="0">
                           <a:solidFill>
                             <a:schemeClr val="tx1">
                               <a:lumMod val="65000"/>
@@ -7332,19 +7584,7 @@
                           </a:solidFill>
                           <a:latin typeface="+mn-lt"/>
                         </a:rPr>
-                        <a:t>Véhicules</a:t>
-                      </a:r>
-                      <a:r>
-                        <a:rPr lang="fr-FR" sz="1600" b="0" baseline="0" dirty="0">
-                          <a:solidFill>
-                            <a:schemeClr val="tx1">
-                              <a:lumMod val="65000"/>
-                              <a:lumOff val="35000"/>
-                            </a:schemeClr>
-                          </a:solidFill>
-                          <a:latin typeface="+mn-lt"/>
-                        </a:rPr>
-                        <a:t> additionnels</a:t>
+                        <a:t>Système de vie</a:t>
                       </a:r>
                       <a:endParaRPr lang="fr-FR" sz="1600" b="0" dirty="0">
                         <a:solidFill>
@@ -7359,9 +7599,7 @@
                   </a:txBody>
                   <a:tcPr>
                     <a:solidFill>
-                      <a:schemeClr val="bg1">
-                        <a:lumMod val="95000"/>
-                      </a:schemeClr>
+                      <a:schemeClr val="bg1"/>
                     </a:solidFill>
                   </a:tcPr>
                 </a:tc>
@@ -7370,7 +7608,35 @@
                     <a:bodyPr/>
                     <a:lstStyle/>
                     <a:p>
-                      <a:pPr algn="r"/>
+                      <a:pPr marL="0" marR="0" lvl="0" indent="0" algn="r" defTabSz="914400" rtl="0" eaLnBrk="1" fontAlgn="auto" latinLnBrk="0" hangingPunct="1">
+                        <a:lnSpc>
+                          <a:spcPct val="100000"/>
+                        </a:lnSpc>
+                        <a:spcBef>
+                          <a:spcPts val="0"/>
+                        </a:spcBef>
+                        <a:spcAft>
+                          <a:spcPts val="0"/>
+                        </a:spcAft>
+                        <a:buClrTx/>
+                        <a:buSzTx/>
+                        <a:buFontTx/>
+                        <a:buNone/>
+                        <a:tabLst/>
+                        <a:defRPr/>
+                      </a:pPr>
+                      <a:r>
+                        <a:rPr lang="fr-FR" b="0" dirty="0" smtClean="0">
+                          <a:solidFill>
+                            <a:schemeClr val="tx1">
+                              <a:lumMod val="65000"/>
+                              <a:lumOff val="35000"/>
+                            </a:schemeClr>
+                          </a:solidFill>
+                          <a:latin typeface="+mn-lt"/>
+                        </a:rPr>
+                        <a:t>300</a:t>
+                      </a:r>
                       <a:r>
                         <a:rPr lang="fr-FR" b="0" dirty="0">
                           <a:solidFill>
@@ -7381,7 +7647,7 @@
                           </a:solidFill>
                           <a:latin typeface="+mn-lt"/>
                         </a:rPr>
-                        <a:t>300€/types</a:t>
+                        <a:t>€</a:t>
                       </a:r>
                     </a:p>
                   </a:txBody>
@@ -7402,7 +7668,7 @@
                 </a:tc>
                 <a:extLst>
                   <a:ext uri="{0D108BD9-81ED-4DB2-BD59-A6C34878D82A}">
-                    <a16:rowId xmlns:a16="http://schemas.microsoft.com/office/drawing/2014/main" val="2493942223"/>
+                    <a16:rowId xmlns:a16="http://schemas.microsoft.com/office/drawing/2014/main" xmlns="" val="3752774149"/>
                   </a:ext>
                 </a:extLst>
               </a:tr>
@@ -7476,7 +7742,7 @@
                         <a:defRPr/>
                       </a:pPr>
                       <a:r>
-                        <a:rPr lang="fr-FR" sz="1600" b="0" baseline="0" dirty="0">
+                        <a:rPr lang="fr-FR" sz="1600" b="0" dirty="0" smtClean="0">
                           <a:solidFill>
                             <a:schemeClr val="tx1">
                               <a:lumMod val="65000"/>
@@ -7485,7 +7751,7 @@
                           </a:solidFill>
                           <a:latin typeface="+mn-lt"/>
                         </a:rPr>
-                        <a:t>Scénario</a:t>
+                        <a:t>Score</a:t>
                       </a:r>
                       <a:endParaRPr lang="fr-FR" sz="1600" b="0" dirty="0">
                         <a:solidFill>
@@ -7500,7 +7766,9 @@
                   </a:txBody>
                   <a:tcPr>
                     <a:solidFill>
-                      <a:schemeClr val="bg1"/>
+                      <a:schemeClr val="bg1">
+                        <a:lumMod val="95000"/>
+                      </a:schemeClr>
                     </a:solidFill>
                   </a:tcPr>
                 </a:tc>
@@ -7509,23 +7777,19 @@
                     <a:bodyPr/>
                     <a:lstStyle/>
                     <a:p>
-                      <a:pPr marL="0" marR="0" lvl="0" indent="0" algn="r" defTabSz="914400" rtl="0" eaLnBrk="1" fontAlgn="auto" latinLnBrk="0" hangingPunct="1">
-                        <a:lnSpc>
-                          <a:spcPct val="100000"/>
-                        </a:lnSpc>
-                        <a:spcBef>
-                          <a:spcPts val="0"/>
-                        </a:spcBef>
-                        <a:spcAft>
-                          <a:spcPts val="0"/>
-                        </a:spcAft>
-                        <a:buClrTx/>
-                        <a:buSzTx/>
-                        <a:buFontTx/>
-                        <a:buNone/>
-                        <a:tabLst/>
-                        <a:defRPr/>
-                      </a:pPr>
+                      <a:pPr algn="r"/>
+                      <a:r>
+                        <a:rPr lang="fr-FR" b="0" dirty="0" smtClean="0">
+                          <a:solidFill>
+                            <a:schemeClr val="tx1">
+                              <a:lumMod val="65000"/>
+                              <a:lumOff val="35000"/>
+                            </a:schemeClr>
+                          </a:solidFill>
+                          <a:latin typeface="+mn-lt"/>
+                        </a:rPr>
+                        <a:t>300</a:t>
+                      </a:r>
                       <a:r>
                         <a:rPr lang="fr-FR" b="0" dirty="0">
                           <a:solidFill>
@@ -7536,7 +7800,7 @@
                           </a:solidFill>
                           <a:latin typeface="+mn-lt"/>
                         </a:rPr>
-                        <a:t>1000€</a:t>
+                        <a:t>€</a:t>
                       </a:r>
                     </a:p>
                   </a:txBody>
@@ -7557,290 +7821,7 @@
                 </a:tc>
                 <a:extLst>
                   <a:ext uri="{0D108BD9-81ED-4DB2-BD59-A6C34878D82A}">
-                    <a16:rowId xmlns:a16="http://schemas.microsoft.com/office/drawing/2014/main" val="3752774149"/>
-                  </a:ext>
-                </a:extLst>
-              </a:tr>
-              <a:tr h="370840">
-                <a:tc>
-                  <a:txBody>
-                    <a:bodyPr/>
-                    <a:lstStyle/>
-                    <a:p>
-                      <a:pPr marL="0" marR="0" lvl="0" indent="0" algn="l" defTabSz="914400" rtl="0" eaLnBrk="1" fontAlgn="auto" latinLnBrk="0" hangingPunct="1">
-                        <a:lnSpc>
-                          <a:spcPct val="100000"/>
-                        </a:lnSpc>
-                        <a:spcBef>
-                          <a:spcPts val="0"/>
-                        </a:spcBef>
-                        <a:spcAft>
-                          <a:spcPts val="0"/>
-                        </a:spcAft>
-                        <a:buClrTx/>
-                        <a:buSzTx/>
-                        <a:buFontTx/>
-                        <a:buNone/>
-                        <a:tabLst/>
-                        <a:defRPr/>
-                      </a:pPr>
-                      <a:endParaRPr lang="fr-FR" b="0" dirty="0">
-                        <a:solidFill>
-                          <a:schemeClr val="tx1">
-                            <a:lumMod val="65000"/>
-                            <a:lumOff val="35000"/>
-                          </a:schemeClr>
-                        </a:solidFill>
-                        <a:latin typeface="+mn-lt"/>
-                      </a:endParaRPr>
-                    </a:p>
-                  </a:txBody>
-                  <a:tcPr>
-                    <a:lnL w="12700" cap="flat" cmpd="sng" algn="ctr">
-                      <a:noFill/>
-                      <a:prstDash val="solid"/>
-                      <a:round/>
-                      <a:headEnd type="none" w="med" len="med"/>
-                      <a:tailEnd type="none" w="med" len="med"/>
-                    </a:lnL>
-                    <a:solidFill>
-                      <a:schemeClr val="bg1"/>
-                    </a:solidFill>
-                  </a:tcPr>
-                </a:tc>
-                <a:tc>
-                  <a:txBody>
-                    <a:bodyPr/>
-                    <a:lstStyle/>
-                    <a:p>
-                      <a:pPr marL="0" marR="0" lvl="0" indent="0" algn="l" defTabSz="914400" rtl="0" eaLnBrk="1" fontAlgn="auto" latinLnBrk="0" hangingPunct="1">
-                        <a:lnSpc>
-                          <a:spcPct val="100000"/>
-                        </a:lnSpc>
-                        <a:spcBef>
-                          <a:spcPts val="0"/>
-                        </a:spcBef>
-                        <a:spcAft>
-                          <a:spcPts val="0"/>
-                        </a:spcAft>
-                        <a:buClrTx/>
-                        <a:buSzTx/>
-                        <a:buFontTx/>
-                        <a:buNone/>
-                        <a:tabLst/>
-                        <a:defRPr/>
-                      </a:pPr>
-                      <a:r>
-                        <a:rPr lang="fr-FR" sz="1600" b="0" dirty="0">
-                          <a:solidFill>
-                            <a:schemeClr val="tx1">
-                              <a:lumMod val="65000"/>
-                              <a:lumOff val="35000"/>
-                            </a:schemeClr>
-                          </a:solidFill>
-                          <a:latin typeface="+mn-lt"/>
-                        </a:rPr>
-                        <a:t>Support complet Mac OS et Linux</a:t>
-                      </a:r>
-                    </a:p>
-                  </a:txBody>
-                  <a:tcPr>
-                    <a:solidFill>
-                      <a:schemeClr val="bg1">
-                        <a:lumMod val="95000"/>
-                      </a:schemeClr>
-                    </a:solidFill>
-                  </a:tcPr>
-                </a:tc>
-                <a:tc>
-                  <a:txBody>
-                    <a:bodyPr/>
-                    <a:lstStyle/>
-                    <a:p>
-                      <a:pPr algn="r"/>
-                      <a:r>
-                        <a:rPr lang="fr-FR" b="0" dirty="0">
-                          <a:solidFill>
-                            <a:schemeClr val="tx1">
-                              <a:lumMod val="65000"/>
-                              <a:lumOff val="35000"/>
-                            </a:schemeClr>
-                          </a:solidFill>
-                          <a:latin typeface="+mn-lt"/>
-                        </a:rPr>
-                        <a:t>2000€</a:t>
-                      </a:r>
-                    </a:p>
-                  </a:txBody>
-                  <a:tcPr>
-                    <a:lnR w="12700" cap="flat" cmpd="sng" algn="ctr">
-                      <a:noFill/>
-                      <a:prstDash val="solid"/>
-                      <a:round/>
-                      <a:headEnd type="none" w="med" len="med"/>
-                      <a:tailEnd type="none" w="med" len="med"/>
-                    </a:lnR>
-                    <a:solidFill>
-                      <a:schemeClr val="bg1">
-                        <a:lumMod val="95000"/>
-                      </a:schemeClr>
-                    </a:solidFill>
-                  </a:tcPr>
-                </a:tc>
-                <a:extLst>
-                  <a:ext uri="{0D108BD9-81ED-4DB2-BD59-A6C34878D82A}">
-                    <a16:rowId xmlns:a16="http://schemas.microsoft.com/office/drawing/2014/main" val="2900576377"/>
-                  </a:ext>
-                </a:extLst>
-              </a:tr>
-              <a:tr h="370840">
-                <a:tc>
-                  <a:txBody>
-                    <a:bodyPr/>
-                    <a:lstStyle/>
-                    <a:p>
-                      <a:pPr marL="0" marR="0" lvl="0" indent="0" algn="l" defTabSz="914400" rtl="0" eaLnBrk="1" fontAlgn="auto" latinLnBrk="0" hangingPunct="1">
-                        <a:lnSpc>
-                          <a:spcPct val="100000"/>
-                        </a:lnSpc>
-                        <a:spcBef>
-                          <a:spcPts val="0"/>
-                        </a:spcBef>
-                        <a:spcAft>
-                          <a:spcPts val="0"/>
-                        </a:spcAft>
-                        <a:buClrTx/>
-                        <a:buSzTx/>
-                        <a:buFontTx/>
-                        <a:buNone/>
-                        <a:tabLst/>
-                        <a:defRPr/>
-                      </a:pPr>
-                      <a:endParaRPr lang="fr-FR" b="0" dirty="0">
-                        <a:solidFill>
-                          <a:schemeClr val="tx1">
-                            <a:lumMod val="65000"/>
-                            <a:lumOff val="35000"/>
-                          </a:schemeClr>
-                        </a:solidFill>
-                        <a:latin typeface="+mn-lt"/>
-                      </a:endParaRPr>
-                    </a:p>
-                  </a:txBody>
-                  <a:tcPr>
-                    <a:lnL w="12700" cap="flat" cmpd="sng" algn="ctr">
-                      <a:noFill/>
-                      <a:prstDash val="solid"/>
-                      <a:round/>
-                      <a:headEnd type="none" w="med" len="med"/>
-                      <a:tailEnd type="none" w="med" len="med"/>
-                    </a:lnL>
-                    <a:solidFill>
-                      <a:schemeClr val="bg1"/>
-                    </a:solidFill>
-                  </a:tcPr>
-                </a:tc>
-                <a:tc>
-                  <a:txBody>
-                    <a:bodyPr/>
-                    <a:lstStyle/>
-                    <a:p>
-                      <a:pPr marL="0" marR="0" lvl="0" indent="0" algn="l" defTabSz="914400" rtl="0" eaLnBrk="1" fontAlgn="auto" latinLnBrk="0" hangingPunct="1">
-                        <a:lnSpc>
-                          <a:spcPct val="100000"/>
-                        </a:lnSpc>
-                        <a:spcBef>
-                          <a:spcPts val="0"/>
-                        </a:spcBef>
-                        <a:spcAft>
-                          <a:spcPts val="0"/>
-                        </a:spcAft>
-                        <a:buClrTx/>
-                        <a:buSzTx/>
-                        <a:buFontTx/>
-                        <a:buNone/>
-                        <a:tabLst/>
-                        <a:defRPr/>
-                      </a:pPr>
-                      <a:r>
-                        <a:rPr lang="fr-FR" sz="1600" b="0" dirty="0">
-                          <a:solidFill>
-                            <a:schemeClr val="tx1">
-                              <a:lumMod val="65000"/>
-                              <a:lumOff val="35000"/>
-                            </a:schemeClr>
-                          </a:solidFill>
-                          <a:latin typeface="+mn-lt"/>
-                        </a:rPr>
-                        <a:t>Autre</a:t>
-                      </a:r>
-                    </a:p>
-                  </a:txBody>
-                  <a:tcPr>
-                    <a:solidFill>
-                      <a:schemeClr val="bg1"/>
-                    </a:solidFill>
-                  </a:tcPr>
-                </a:tc>
-                <a:tc>
-                  <a:txBody>
-                    <a:bodyPr/>
-                    <a:lstStyle/>
-                    <a:p>
-                      <a:pPr algn="r"/>
-                      <a:r>
-                        <a:rPr lang="fr-FR" b="0" dirty="0">
-                          <a:solidFill>
-                            <a:schemeClr val="tx1">
-                              <a:lumMod val="65000"/>
-                              <a:lumOff val="35000"/>
-                            </a:schemeClr>
-                          </a:solidFill>
-                          <a:latin typeface="+mn-lt"/>
-                        </a:rPr>
-                        <a:t>Sur</a:t>
-                      </a:r>
-                      <a:r>
-                        <a:rPr lang="fr-FR" b="0" baseline="0" dirty="0">
-                          <a:solidFill>
-                            <a:schemeClr val="tx1">
-                              <a:lumMod val="65000"/>
-                              <a:lumOff val="35000"/>
-                            </a:schemeClr>
-                          </a:solidFill>
-                          <a:latin typeface="+mn-lt"/>
-                        </a:rPr>
-                        <a:t> mesure</a:t>
-                      </a:r>
-                      <a:endParaRPr lang="fr-FR" b="0" dirty="0">
-                        <a:solidFill>
-                          <a:schemeClr val="tx1">
-                            <a:lumMod val="65000"/>
-                            <a:lumOff val="35000"/>
-                          </a:schemeClr>
-                        </a:solidFill>
-                        <a:latin typeface="+mn-lt"/>
-                      </a:endParaRPr>
-                    </a:p>
-                  </a:txBody>
-                  <a:tcPr>
-                    <a:lnR w="12700" cap="flat" cmpd="sng" algn="ctr">
-                      <a:noFill/>
-                      <a:prstDash val="solid"/>
-                      <a:round/>
-                      <a:headEnd type="none" w="med" len="med"/>
-                      <a:tailEnd type="none" w="med" len="med"/>
-                    </a:lnR>
-                    <a:solidFill>
-                      <a:schemeClr val="bg1">
-                        <a:lumMod val="95000"/>
-                      </a:schemeClr>
-                    </a:solidFill>
-                  </a:tcPr>
-                </a:tc>
-                <a:extLst>
-                  <a:ext uri="{0D108BD9-81ED-4DB2-BD59-A6C34878D82A}">
-                    <a16:rowId xmlns:a16="http://schemas.microsoft.com/office/drawing/2014/main" val="3156999127"/>
+                    <a16:rowId xmlns:a16="http://schemas.microsoft.com/office/drawing/2014/main" xmlns="" val="2900576377"/>
                   </a:ext>
                 </a:extLst>
               </a:tr>
@@ -7889,7 +7870,31 @@
                           </a:solidFill>
                           <a:latin typeface="+mn-lt"/>
                         </a:rPr>
-                        <a:t> technique du jeu sur 1 ans (ajustable)</a:t>
+                        <a:t> technique du jeu sur 1 </a:t>
+                      </a:r>
+                      <a:r>
+                        <a:rPr lang="fr-FR" b="0" baseline="0" dirty="0" smtClean="0">
+                          <a:solidFill>
+                            <a:schemeClr val="tx1">
+                              <a:lumMod val="65000"/>
+                              <a:lumOff val="35000"/>
+                            </a:schemeClr>
+                          </a:solidFill>
+                          <a:latin typeface="+mn-lt"/>
+                        </a:rPr>
+                        <a:t>an </a:t>
+                      </a:r>
+                      <a:r>
+                        <a:rPr lang="fr-FR" b="0" baseline="0" dirty="0">
+                          <a:solidFill>
+                            <a:schemeClr val="tx1">
+                              <a:lumMod val="65000"/>
+                              <a:lumOff val="35000"/>
+                            </a:schemeClr>
+                          </a:solidFill>
+                          <a:latin typeface="+mn-lt"/>
+                        </a:rPr>
+                        <a:t>(ajustable)</a:t>
                       </a:r>
                       <a:endParaRPr lang="fr-FR" b="0" dirty="0">
                         <a:solidFill>
@@ -7941,7 +7946,7 @@
                     <a:p>
                       <a:pPr algn="r"/>
                       <a:r>
-                        <a:rPr lang="fr-FR" b="0" dirty="0">
+                        <a:rPr lang="fr-FR" b="0" dirty="0" smtClean="0">
                           <a:solidFill>
                             <a:schemeClr val="tx1">
                               <a:lumMod val="65000"/>
@@ -7950,8 +7955,17 @@
                           </a:solidFill>
                           <a:latin typeface="+mn-lt"/>
                         </a:rPr>
-                        <a:t>Sur mesure</a:t>
+                        <a:t>2000€</a:t>
                       </a:r>
+                      <a:endParaRPr lang="fr-FR" b="0" dirty="0">
+                        <a:solidFill>
+                          <a:schemeClr val="tx1">
+                            <a:lumMod val="65000"/>
+                            <a:lumOff val="35000"/>
+                          </a:schemeClr>
+                        </a:solidFill>
+                        <a:latin typeface="+mn-lt"/>
+                      </a:endParaRPr>
                     </a:p>
                   </a:txBody>
                   <a:tcPr>
@@ -7974,226 +7988,7 @@
                 </a:tc>
                 <a:extLst>
                   <a:ext uri="{0D108BD9-81ED-4DB2-BD59-A6C34878D82A}">
-                    <a16:rowId xmlns:a16="http://schemas.microsoft.com/office/drawing/2014/main" val="3767000208"/>
-                  </a:ext>
-                </a:extLst>
-              </a:tr>
-              <a:tr h="318646">
-                <a:tc>
-                  <a:txBody>
-                    <a:bodyPr/>
-                    <a:lstStyle/>
-                    <a:p>
-                      <a:pPr marL="0" marR="0" lvl="0" indent="0" algn="l" defTabSz="914400" rtl="0" eaLnBrk="1" fontAlgn="auto" latinLnBrk="0" hangingPunct="1">
-                        <a:lnSpc>
-                          <a:spcPct val="100000"/>
-                        </a:lnSpc>
-                        <a:spcBef>
-                          <a:spcPts val="0"/>
-                        </a:spcBef>
-                        <a:spcAft>
-                          <a:spcPts val="0"/>
-                        </a:spcAft>
-                        <a:buClrTx/>
-                        <a:buSzTx/>
-                        <a:buFontTx/>
-                        <a:buNone/>
-                        <a:tabLst/>
-                        <a:defRPr/>
-                      </a:pPr>
-                      <a:endParaRPr lang="fr-FR" b="0" dirty="0">
-                        <a:solidFill>
-                          <a:schemeClr val="tx1">
-                            <a:lumMod val="65000"/>
-                            <a:lumOff val="35000"/>
-                          </a:schemeClr>
-                        </a:solidFill>
-                        <a:latin typeface="+mn-lt"/>
-                      </a:endParaRPr>
-                    </a:p>
-                  </a:txBody>
-                  <a:tcPr>
-                    <a:lnL w="12700" cap="flat" cmpd="sng" algn="ctr">
-                      <a:noFill/>
-                      <a:prstDash val="solid"/>
-                      <a:round/>
-                      <a:headEnd type="none" w="med" len="med"/>
-                      <a:tailEnd type="none" w="med" len="med"/>
-                    </a:lnL>
-                    <a:lnR w="12700" cap="flat" cmpd="sng" algn="ctr">
-                      <a:noFill/>
-                      <a:prstDash val="solid"/>
-                      <a:round/>
-                      <a:headEnd type="none" w="med" len="med"/>
-                      <a:tailEnd type="none" w="med" len="med"/>
-                    </a:lnR>
-                    <a:lnT w="12700" cap="flat" cmpd="sng" algn="ctr">
-                      <a:noFill/>
-                      <a:prstDash val="solid"/>
-                      <a:round/>
-                      <a:headEnd type="none" w="med" len="med"/>
-                      <a:tailEnd type="none" w="med" len="med"/>
-                    </a:lnT>
-                    <a:lnB w="12700" cap="flat" cmpd="sng" algn="ctr">
-                      <a:noFill/>
-                      <a:prstDash val="solid"/>
-                      <a:round/>
-                      <a:headEnd type="none" w="med" len="med"/>
-                      <a:tailEnd type="none" w="med" len="med"/>
-                    </a:lnB>
-                    <a:lnTlToBr w="12700" cmpd="sng">
-                      <a:noFill/>
-                      <a:prstDash val="solid"/>
-                    </a:lnTlToBr>
-                    <a:lnBlToTr w="12700" cmpd="sng">
-                      <a:noFill/>
-                      <a:prstDash val="solid"/>
-                    </a:lnBlToTr>
-                    <a:solidFill>
-                      <a:schemeClr val="bg1"/>
-                    </a:solidFill>
-                  </a:tcPr>
-                </a:tc>
-                <a:tc>
-                  <a:txBody>
-                    <a:bodyPr/>
-                    <a:lstStyle/>
-                    <a:p>
-                      <a:pPr marL="0" marR="0" lvl="0" indent="0" algn="l" defTabSz="914400" rtl="0" eaLnBrk="1" fontAlgn="auto" latinLnBrk="0" hangingPunct="1">
-                        <a:lnSpc>
-                          <a:spcPct val="100000"/>
-                        </a:lnSpc>
-                        <a:spcBef>
-                          <a:spcPts val="0"/>
-                        </a:spcBef>
-                        <a:spcAft>
-                          <a:spcPts val="0"/>
-                        </a:spcAft>
-                        <a:buClrTx/>
-                        <a:buSzTx/>
-                        <a:buFontTx/>
-                        <a:buNone/>
-                        <a:tabLst/>
-                        <a:defRPr/>
-                      </a:pPr>
-                      <a:r>
-                        <a:rPr lang="fr-FR" sz="1600" b="0" dirty="0">
-                          <a:solidFill>
-                            <a:schemeClr val="tx1">
-                              <a:lumMod val="65000"/>
-                              <a:lumOff val="35000"/>
-                            </a:schemeClr>
-                          </a:solidFill>
-                          <a:latin typeface="+mn-lt"/>
-                        </a:rPr>
-                        <a:t>1</a:t>
-                      </a:r>
-                      <a:r>
-                        <a:rPr lang="fr-FR" sz="1600" b="0" baseline="0" dirty="0">
-                          <a:solidFill>
-                            <a:schemeClr val="tx1">
-                              <a:lumMod val="65000"/>
-                              <a:lumOff val="35000"/>
-                            </a:schemeClr>
-                          </a:solidFill>
-                          <a:latin typeface="+mn-lt"/>
-                        </a:rPr>
-                        <a:t> Ans</a:t>
-                      </a:r>
-                      <a:endParaRPr lang="fr-FR" sz="1600" b="0" dirty="0">
-                        <a:solidFill>
-                          <a:schemeClr val="tx1">
-                            <a:lumMod val="65000"/>
-                            <a:lumOff val="35000"/>
-                          </a:schemeClr>
-                        </a:solidFill>
-                        <a:latin typeface="+mn-lt"/>
-                      </a:endParaRPr>
-                    </a:p>
-                  </a:txBody>
-                  <a:tcPr>
-                    <a:lnL w="12700" cap="flat" cmpd="sng" algn="ctr">
-                      <a:noFill/>
-                      <a:prstDash val="solid"/>
-                      <a:round/>
-                      <a:headEnd type="none" w="med" len="med"/>
-                      <a:tailEnd type="none" w="med" len="med"/>
-                    </a:lnL>
-                    <a:lnR w="12700" cmpd="sng">
-                      <a:noFill/>
-                    </a:lnR>
-                    <a:lnT w="38100" cmpd="sng">
-                      <a:noFill/>
-                    </a:lnT>
-                    <a:lnB w="12700" cmpd="sng">
-                      <a:noFill/>
-                    </a:lnB>
-                    <a:lnTlToBr w="12700" cmpd="sng">
-                      <a:noFill/>
-                      <a:prstDash val="solid"/>
-                    </a:lnTlToBr>
-                    <a:lnBlToTr w="12700" cmpd="sng">
-                      <a:noFill/>
-                      <a:prstDash val="solid"/>
-                    </a:lnBlToTr>
-                    <a:solidFill>
-                      <a:schemeClr val="bg1"/>
-                    </a:solidFill>
-                  </a:tcPr>
-                </a:tc>
-                <a:tc>
-                  <a:txBody>
-                    <a:bodyPr/>
-                    <a:lstStyle/>
-                    <a:p>
-                      <a:pPr algn="r"/>
-                      <a:r>
-                        <a:rPr lang="fr-FR" b="0" dirty="0">
-                          <a:solidFill>
-                            <a:schemeClr val="tx1">
-                              <a:lumMod val="65000"/>
-                              <a:lumOff val="35000"/>
-                            </a:schemeClr>
-                          </a:solidFill>
-                          <a:latin typeface="+mn-lt"/>
-                        </a:rPr>
-                        <a:t>2000€</a:t>
-                      </a:r>
-                    </a:p>
-                  </a:txBody>
-                  <a:tcPr>
-                    <a:lnL w="12700" cmpd="sng">
-                      <a:noFill/>
-                    </a:lnL>
-                    <a:lnR w="12700" cap="flat" cmpd="sng" algn="ctr">
-                      <a:noFill/>
-                      <a:prstDash val="solid"/>
-                      <a:round/>
-                      <a:headEnd type="none" w="med" len="med"/>
-                      <a:tailEnd type="none" w="med" len="med"/>
-                    </a:lnR>
-                    <a:lnT w="38100" cmpd="sng">
-                      <a:noFill/>
-                    </a:lnT>
-                    <a:lnB w="12700" cmpd="sng">
-                      <a:noFill/>
-                    </a:lnB>
-                    <a:lnTlToBr w="12700" cmpd="sng">
-                      <a:noFill/>
-                      <a:prstDash val="solid"/>
-                    </a:lnTlToBr>
-                    <a:lnBlToTr w="12700" cmpd="sng">
-                      <a:noFill/>
-                      <a:prstDash val="solid"/>
-                    </a:lnBlToTr>
-                    <a:solidFill>
-                      <a:schemeClr val="bg1"/>
-                    </a:solidFill>
-                  </a:tcPr>
-                </a:tc>
-                <a:extLst>
-                  <a:ext uri="{0D108BD9-81ED-4DB2-BD59-A6C34878D82A}">
-                    <a16:rowId xmlns:a16="http://schemas.microsoft.com/office/drawing/2014/main" val="1632742703"/>
+                    <a16:rowId xmlns:a16="http://schemas.microsoft.com/office/drawing/2014/main" xmlns="" val="3767000208"/>
                   </a:ext>
                 </a:extLst>
               </a:tr>

</xml_diff>